<commit_message>
Updated to slides thanks to @kellerb
</commit_message>
<xml_diff>
--- a/2014-oss/day-09/IntroductionToSoftwareClass.pptx
+++ b/2014-oss/day-09/IntroductionToSoftwareClass.pptx
@@ -3145,13 +3145,18 @@
               <a:t>    float result = value * </a:t>
             </a:r>
             <a:r>
-              <a:rPr lang="en-US" dirty="0" err="1"/>
+              <a:rPr lang="en-US" dirty="0" smtClean="0"/>
+              <a:t>( </a:t>
+            </a:r>
+            <a:r>
+              <a:rPr lang="en-US" dirty="0" err="1" smtClean="0"/>
               <a:t>pct</a:t>
             </a:r>
             <a:r>
-              <a:rPr lang="en-US" dirty="0"/>
-              <a:t>;</a:t>
-            </a:r>
+              <a:rPr lang="en-US" dirty="0" smtClean="0"/>
+              <a:t> / 100 );</a:t>
+            </a:r>
+            <a:endParaRPr lang="en-US" dirty="0"/>
           </a:p>
           <a:p>
             <a:pPr marL="0" indent="0">
@@ -3208,7 +3213,7 @@
             </a:r>
             <a:r>
               <a:rPr lang="en-US" dirty="0" smtClean="0"/>
-              <a:t>( 10, 1.1 );</a:t>
+              <a:t>( 10, 110 );</a:t>
             </a:r>
             <a:endParaRPr lang="en-US" dirty="0"/>
           </a:p>
@@ -4139,7 +4144,15 @@
             </a:r>
             <a:r>
               <a:rPr lang="en-US" dirty="0"/>
-              <a:t>- there is a solution but its out </a:t>
+              <a:t>- there is a solution but </a:t>
+            </a:r>
+            <a:r>
+              <a:rPr lang="en-US" dirty="0" smtClean="0"/>
+              <a:t>it is </a:t>
+            </a:r>
+            <a:r>
+              <a:rPr lang="en-US" dirty="0"/>
+              <a:t>out </a:t>
             </a:r>
             <a:r>
               <a:rPr lang="en-US" dirty="0" smtClean="0"/>
@@ -4358,11 +4371,19 @@
             </a:pPr>
             <a:r>
               <a:rPr lang="en-US" dirty="0" smtClean="0"/>
-              <a:t>Warning </a:t>
-            </a:r>
-            <a:r>
-              <a:rPr lang="en-US" dirty="0"/>
-              <a:t>signs a </a:t>
+              <a:t>Warning signs</a:t>
+            </a:r>
+            <a:r>
+              <a:rPr lang="en-US" dirty="0"/>
+              <a:t> </a:t>
+            </a:r>
+            <a:r>
+              <a:rPr lang="en-US" dirty="0" smtClean="0"/>
+              <a:t>that </a:t>
+            </a:r>
+            <a:r>
+              <a:rPr lang="en-US" dirty="0"/>
+              <a:t>a </a:t>
             </a:r>
             <a:r>
               <a:rPr lang="en-US" dirty="0" smtClean="0"/>
@@ -4370,35 +4391,48 @@
             </a:r>
             <a:r>
               <a:rPr lang="en-US" dirty="0"/>
-              <a:t>is too long and needs refactored</a:t>
-            </a:r>
-          </a:p>
-          <a:p>
-            <a:r>
-              <a:rPr lang="en-US" dirty="0"/>
-              <a:t>deeply nested logic</a:t>
-            </a:r>
-          </a:p>
-          <a:p>
-            <a:r>
-              <a:rPr lang="en-US" dirty="0"/>
-              <a:t>totally different behavior based on inputs</a:t>
-            </a:r>
-          </a:p>
-          <a:p>
-            <a:r>
-              <a:rPr lang="en-US" dirty="0"/>
-              <a:t>duplicated chunks of code ( DRY Principle )</a:t>
-            </a:r>
-          </a:p>
-          <a:p>
-            <a:r>
-              <a:rPr lang="en-US" dirty="0"/>
-              <a:t>what </a:t>
-            </a:r>
-            <a:r>
-              <a:rPr lang="en-US" dirty="0" smtClean="0"/>
-              <a:t>it </a:t>
+              <a:t>is too long and needs </a:t>
+            </a:r>
+            <a:r>
+              <a:rPr lang="en-US" dirty="0" smtClean="0"/>
+              <a:t>refactored:</a:t>
+            </a:r>
+            <a:endParaRPr lang="en-US" dirty="0"/>
+          </a:p>
+          <a:p>
+            <a:r>
+              <a:rPr lang="en-US" dirty="0" smtClean="0"/>
+              <a:t>Deeply </a:t>
+            </a:r>
+            <a:r>
+              <a:rPr lang="en-US" dirty="0"/>
+              <a:t>nested logic</a:t>
+            </a:r>
+          </a:p>
+          <a:p>
+            <a:r>
+              <a:rPr lang="en-US" dirty="0" smtClean="0"/>
+              <a:t>Totally </a:t>
+            </a:r>
+            <a:r>
+              <a:rPr lang="en-US" dirty="0"/>
+              <a:t>different behavior based on inputs</a:t>
+            </a:r>
+          </a:p>
+          <a:p>
+            <a:r>
+              <a:rPr lang="en-US" dirty="0" smtClean="0"/>
+              <a:t>Duplicated </a:t>
+            </a:r>
+            <a:r>
+              <a:rPr lang="en-US" dirty="0"/>
+              <a:t>chunks of code ( DRY Principle )</a:t>
+            </a:r>
+          </a:p>
+          <a:p>
+            <a:r>
+              <a:rPr lang="en-US" dirty="0" smtClean="0"/>
+              <a:t>What it </a:t>
             </a:r>
             <a:r>
               <a:rPr lang="en-US" dirty="0"/>
@@ -4407,8 +4441,12 @@
           </a:p>
           <a:p>
             <a:r>
-              <a:rPr lang="en-US" dirty="0"/>
-              <a:t>does not fit on a </a:t>
+              <a:rPr lang="en-US" dirty="0" smtClean="0"/>
+              <a:t>Does </a:t>
+            </a:r>
+            <a:r>
+              <a:rPr lang="en-US" dirty="0"/>
+              <a:t>not fit on a </a:t>
             </a:r>
             <a:r>
               <a:rPr lang="en-US" dirty="0" smtClean="0"/>
@@ -4520,7 +4558,15 @@
             </a:r>
             <a:r>
               <a:rPr lang="en-US" dirty="0"/>
-              <a:t> into more simple fragments</a:t>
+              <a:t> </a:t>
+            </a:r>
+            <a:r>
+              <a:rPr lang="en-US" dirty="0" smtClean="0"/>
+              <a:t>into simpler </a:t>
+            </a:r>
+            <a:r>
+              <a:rPr lang="en-US" dirty="0"/>
+              <a:t>fragments</a:t>
             </a:r>
           </a:p>
           <a:p>
@@ -4530,7 +4576,15 @@
             </a:r>
             <a:r>
               <a:rPr lang="en-US" dirty="0"/>
-              <a:t>solutions to these simple problems fragments in code -- components</a:t>
+              <a:t>solutions to these simple </a:t>
+            </a:r>
+            <a:r>
+              <a:rPr lang="en-US" dirty="0" smtClean="0"/>
+              <a:t>problem </a:t>
+            </a:r>
+            <a:r>
+              <a:rPr lang="en-US" dirty="0"/>
+              <a:t>fragments in code -- components</a:t>
             </a:r>
           </a:p>
           <a:p>
@@ -4642,38 +4696,70 @@
           <a:lstStyle/>
           <a:p>
             <a:r>
-              <a:rPr lang="en-US" dirty="0"/>
-              <a:t>real world problems need to be captured in a way a computer can understand</a:t>
-            </a:r>
-          </a:p>
-          <a:p>
-            <a:r>
-              <a:rPr lang="en-US" dirty="0"/>
-              <a:t>interesting problems require considerable amounts of code</a:t>
-            </a:r>
-          </a:p>
-          <a:p>
-            <a:r>
-              <a:rPr lang="en-US" dirty="0"/>
-              <a:t>there is never enough time to do it right the first time</a:t>
-            </a:r>
-          </a:p>
-          <a:p>
-            <a:r>
-              <a:rPr lang="en-US" dirty="0"/>
-              <a:t>no one has time to actually learn -- we're too busy getting real work done</a:t>
-            </a:r>
-          </a:p>
-          <a:p>
-            <a:r>
-              <a:rPr lang="en-US" dirty="0"/>
-              <a:t>every real world problem is comprised of many we have yet to discover</a:t>
-            </a:r>
-          </a:p>
-          <a:p>
-            <a:r>
-              <a:rPr lang="en-US" dirty="0"/>
-              <a:t>one thing changes and the code breaks in some other random </a:t>
+              <a:rPr lang="en-US" dirty="0" smtClean="0"/>
+              <a:t>Real </a:t>
+            </a:r>
+            <a:r>
+              <a:rPr lang="en-US" dirty="0"/>
+              <a:t>world problems need to be captured in a way a computer can understand</a:t>
+            </a:r>
+          </a:p>
+          <a:p>
+            <a:r>
+              <a:rPr lang="en-US" dirty="0" smtClean="0"/>
+              <a:t>Interesting </a:t>
+            </a:r>
+            <a:r>
+              <a:rPr lang="en-US" dirty="0"/>
+              <a:t>problems require considerable amounts of code</a:t>
+            </a:r>
+          </a:p>
+          <a:p>
+            <a:r>
+              <a:rPr lang="en-US" dirty="0" smtClean="0"/>
+              <a:t>There </a:t>
+            </a:r>
+            <a:r>
+              <a:rPr lang="en-US" dirty="0"/>
+              <a:t>is never enough time to do it right the first time</a:t>
+            </a:r>
+          </a:p>
+          <a:p>
+            <a:r>
+              <a:rPr lang="en-US" dirty="0" smtClean="0"/>
+              <a:t>No </a:t>
+            </a:r>
+            <a:r>
+              <a:rPr lang="en-US" dirty="0"/>
+              <a:t>one has time to actually learn -- we're too busy getting real work done</a:t>
+            </a:r>
+          </a:p>
+          <a:p>
+            <a:r>
+              <a:rPr lang="en-US" dirty="0" smtClean="0"/>
+              <a:t>Every </a:t>
+            </a:r>
+            <a:r>
+              <a:rPr lang="en-US" dirty="0"/>
+              <a:t>real world problem is comprised of many </a:t>
+            </a:r>
+            <a:r>
+              <a:rPr lang="en-US" smtClean="0"/>
+              <a:t>other problems we </a:t>
+            </a:r>
+            <a:r>
+              <a:rPr lang="en-US" dirty="0"/>
+              <a:t>have yet to discover</a:t>
+            </a:r>
+          </a:p>
+          <a:p>
+            <a:r>
+              <a:rPr lang="en-US" dirty="0" smtClean="0"/>
+              <a:t>One </a:t>
+            </a:r>
+            <a:r>
+              <a:rPr lang="en-US" dirty="0"/>
+              <a:t>thing changes and the code breaks in some other random </a:t>
             </a:r>
             <a:r>
               <a:rPr lang="en-US" dirty="0" smtClean="0"/>
@@ -5068,7 +5154,7 @@
           <a:p>
             <a:r>
               <a:rPr lang="en-US" dirty="0" smtClean="0"/>
-              <a:t>Defines an interface that a component uses to interact with the outside world</a:t>
+              <a:t>Defines an interface that the component uses to interact with the outside world</a:t>
             </a:r>
           </a:p>
           <a:p>
@@ -5185,7 +5271,7 @@
           <a:p>
             <a:r>
               <a:rPr lang="en-US" dirty="0" smtClean="0"/>
-              <a:t>Types Reusable Software</a:t>
+              <a:t>Types of Reusable Software</a:t>
             </a:r>
             <a:endParaRPr lang="en-US" dirty="0"/>
           </a:p>
@@ -5302,7 +5388,9 @@
         </p:nvSpPr>
         <p:spPr/>
         <p:txBody>
-          <a:bodyPr/>
+          <a:bodyPr>
+            <a:normAutofit fontScale="92500" lnSpcReduction="10000"/>
+          </a:bodyPr>
           <a:lstStyle/>
           <a:p>
             <a:pPr marL="0" indent="0">
@@ -5335,11 +5423,11 @@
             </a:r>
             <a:r>
               <a:rPr lang="en-US" dirty="0" smtClean="0"/>
-              <a:t>error </a:t>
-            </a:r>
-            <a:r>
-              <a:rPr lang="en-US" dirty="0"/>
-              <a:t>check here</a:t>
+              <a:t>add error checking </a:t>
+            </a:r>
+            <a:r>
+              <a:rPr lang="en-US" dirty="0"/>
+              <a:t>here</a:t>
             </a:r>
           </a:p>
           <a:p>
@@ -5351,8 +5439,16 @@
               <a:t>    result &lt;- value * </a:t>
             </a:r>
             <a:r>
-              <a:rPr lang="en-US" dirty="0" err="1"/>
+              <a:rPr lang="en-US" dirty="0" smtClean="0"/>
+              <a:t>( </a:t>
+            </a:r>
+            <a:r>
+              <a:rPr lang="en-US" dirty="0" err="1" smtClean="0"/>
               <a:t>pct</a:t>
+            </a:r>
+            <a:r>
+              <a:rPr lang="en-US" dirty="0" smtClean="0"/>
+              <a:t> / 100 )</a:t>
             </a:r>
             <a:endParaRPr lang="en-US" dirty="0"/>
           </a:p>
@@ -5403,7 +5499,15 @@
             </a:r>
             <a:r>
               <a:rPr lang="en-US" dirty="0" smtClean="0"/>
-              <a:t>( 10, 1.1 )</a:t>
+              <a:t>( 10, 110https://github.com/</a:t>
+            </a:r>
+            <a:r>
+              <a:rPr lang="en-US" dirty="0" err="1" smtClean="0"/>
+              <a:t>jasoncoposky</a:t>
+            </a:r>
+            <a:r>
+              <a:rPr lang="en-US" dirty="0" smtClean="0"/>
+              <a:t>/training/tree/master/2014-oss/day-09 )</a:t>
             </a:r>
             <a:endParaRPr lang="en-US" dirty="0"/>
           </a:p>
@@ -5517,7 +5621,11 @@
             </a:pPr>
             <a:r>
               <a:rPr lang="en-US" dirty="0"/>
-              <a:t>    # error check here</a:t>
+              <a:t>    # error check </a:t>
+            </a:r>
+            <a:r>
+              <a:rPr lang="en-US" dirty="0" smtClean="0"/>
+              <a:t>here</a:t>
             </a:r>
           </a:p>
           <a:p>
@@ -5526,11 +5634,33 @@
             </a:pPr>
             <a:r>
               <a:rPr lang="en-US" dirty="0"/>
-              <a:t>    return value * </a:t>
-            </a:r>
-            <a:r>
-              <a:rPr lang="en-US" dirty="0" err="1"/>
+              <a:t> </a:t>
+            </a:r>
+            <a:r>
+              <a:rPr lang="en-US" dirty="0" smtClean="0"/>
+              <a:t>   result = value * ( </a:t>
+            </a:r>
+            <a:r>
+              <a:rPr lang="en-US" dirty="0" err="1" smtClean="0"/>
               <a:t>pct</a:t>
+            </a:r>
+            <a:r>
+              <a:rPr lang="en-US" dirty="0" smtClean="0"/>
+              <a:t> / 100 )</a:t>
+            </a:r>
+            <a:endParaRPr lang="en-US" dirty="0"/>
+          </a:p>
+          <a:p>
+            <a:pPr marL="0" indent="0">
+              <a:buNone/>
+            </a:pPr>
+            <a:r>
+              <a:rPr lang="en-US" dirty="0"/>
+              <a:t>    return </a:t>
+            </a:r>
+            <a:r>
+              <a:rPr lang="en-US" dirty="0" smtClean="0"/>
+              <a:t>result</a:t>
             </a:r>
             <a:endParaRPr lang="en-US" dirty="0"/>
           </a:p>
@@ -5562,8 +5692,8 @@
               <a:t>getPercent</a:t>
             </a:r>
             <a:r>
-              <a:rPr lang="en-US" smtClean="0"/>
-              <a:t>( 10, 1.1 )</a:t>
+              <a:rPr lang="en-US" dirty="0" smtClean="0"/>
+              <a:t>( 10, 110 )</a:t>
             </a:r>
             <a:endParaRPr lang="en-US" dirty="0"/>
           </a:p>

</xml_diff>

<commit_message>
more fixes to the slides, thanks again @kellerb
</commit_message>
<xml_diff>
--- a/2014-oss/day-09/IntroductionToSoftwareClass.pptx
+++ b/2014-oss/day-09/IntroductionToSoftwareClass.pptx
@@ -119,6 +119,11 @@
       </a:defRPr>
     </a:lvl9pPr>
   </p:defaultTextStyle>
+  <p:extLst>
+    <p:ext uri="{EFAFB233-063F-42B5-8137-9DF3F51BA10A}">
+      <p15:sldGuideLst xmlns:p15="http://schemas.microsoft.com/office/powerpoint/2012/main"/>
+    </p:ext>
+  </p:extLst>
 </p:presentation>
 </file>
 
@@ -3133,7 +3138,19 @@
             </a:pPr>
             <a:r>
               <a:rPr lang="en-US" dirty="0"/>
-              <a:t>    /* error check here */</a:t>
+              <a:t>    </a:t>
+            </a:r>
+            <a:r>
+              <a:rPr lang="en-US"/>
+              <a:t>/* </a:t>
+            </a:r>
+            <a:r>
+              <a:rPr lang="en-US" smtClean="0"/>
+              <a:t>add error checking </a:t>
+            </a:r>
+            <a:r>
+              <a:rPr lang="en-US" dirty="0"/>
+              <a:t>here */</a:t>
             </a:r>
           </a:p>
           <a:p>
@@ -5389,7 +5406,7 @@
         <p:spPr/>
         <p:txBody>
           <a:bodyPr>
-            <a:normAutofit fontScale="92500" lnSpcReduction="10000"/>
+            <a:normAutofit/>
           </a:bodyPr>
           <a:lstStyle/>
           <a:p>
@@ -5499,15 +5516,11 @@
             </a:r>
             <a:r>
               <a:rPr lang="en-US" dirty="0" smtClean="0"/>
-              <a:t>( 10, 110https://github.com/</a:t>
-            </a:r>
-            <a:r>
-              <a:rPr lang="en-US" dirty="0" err="1" smtClean="0"/>
-              <a:t>jasoncoposky</a:t>
-            </a:r>
-            <a:r>
-              <a:rPr lang="en-US" dirty="0" smtClean="0"/>
-              <a:t>/training/tree/master/2014-oss/day-09 )</a:t>
+              <a:t>( </a:t>
+            </a:r>
+            <a:r>
+              <a:rPr lang="en-US" dirty="0" smtClean="0"/>
+              <a:t>10, 110 )</a:t>
             </a:r>
             <a:endParaRPr lang="en-US" dirty="0"/>
           </a:p>
@@ -5621,7 +5634,11 @@
             </a:pPr>
             <a:r>
               <a:rPr lang="en-US" dirty="0"/>
-              <a:t>    # error check </a:t>
+              <a:t>    # </a:t>
+            </a:r>
+            <a:r>
+              <a:rPr lang="en-US" dirty="0" smtClean="0"/>
+              <a:t>add error checking </a:t>
             </a:r>
             <a:r>
               <a:rPr lang="en-US" dirty="0" smtClean="0"/>

</xml_diff>

<commit_message>
a few more tweaks
</commit_message>
<xml_diff>
--- a/2014-oss/day-09/IntroductionToSoftwareClass.pptx
+++ b/2014-oss/day-09/IntroductionToSoftwareClass.pptx
@@ -258,7 +258,7 @@
           <a:p>
             <a:fld id="{51D7A023-FFD0-4B7A-9EE2-802EE373A222}" type="datetimeFigureOut">
               <a:rPr lang="en-US" smtClean="0"/>
-              <a:t>7/27/2014</a:t>
+              <a:t>7/29/2014</a:t>
             </a:fld>
             <a:endParaRPr lang="en-US"/>
           </a:p>
@@ -428,7 +428,7 @@
           <a:p>
             <a:fld id="{51D7A023-FFD0-4B7A-9EE2-802EE373A222}" type="datetimeFigureOut">
               <a:rPr lang="en-US" smtClean="0"/>
-              <a:t>7/27/2014</a:t>
+              <a:t>7/29/2014</a:t>
             </a:fld>
             <a:endParaRPr lang="en-US"/>
           </a:p>
@@ -608,7 +608,7 @@
           <a:p>
             <a:fld id="{51D7A023-FFD0-4B7A-9EE2-802EE373A222}" type="datetimeFigureOut">
               <a:rPr lang="en-US" smtClean="0"/>
-              <a:t>7/27/2014</a:t>
+              <a:t>7/29/2014</a:t>
             </a:fld>
             <a:endParaRPr lang="en-US"/>
           </a:p>
@@ -778,7 +778,7 @@
           <a:p>
             <a:fld id="{51D7A023-FFD0-4B7A-9EE2-802EE373A222}" type="datetimeFigureOut">
               <a:rPr lang="en-US" smtClean="0"/>
-              <a:t>7/27/2014</a:t>
+              <a:t>7/29/2014</a:t>
             </a:fld>
             <a:endParaRPr lang="en-US"/>
           </a:p>
@@ -1024,7 +1024,7 @@
           <a:p>
             <a:fld id="{51D7A023-FFD0-4B7A-9EE2-802EE373A222}" type="datetimeFigureOut">
               <a:rPr lang="en-US" smtClean="0"/>
-              <a:t>7/27/2014</a:t>
+              <a:t>7/29/2014</a:t>
             </a:fld>
             <a:endParaRPr lang="en-US"/>
           </a:p>
@@ -1256,7 +1256,7 @@
           <a:p>
             <a:fld id="{51D7A023-FFD0-4B7A-9EE2-802EE373A222}" type="datetimeFigureOut">
               <a:rPr lang="en-US" smtClean="0"/>
-              <a:t>7/27/2014</a:t>
+              <a:t>7/29/2014</a:t>
             </a:fld>
             <a:endParaRPr lang="en-US"/>
           </a:p>
@@ -1623,7 +1623,7 @@
           <a:p>
             <a:fld id="{51D7A023-FFD0-4B7A-9EE2-802EE373A222}" type="datetimeFigureOut">
               <a:rPr lang="en-US" smtClean="0"/>
-              <a:t>7/27/2014</a:t>
+              <a:t>7/29/2014</a:t>
             </a:fld>
             <a:endParaRPr lang="en-US"/>
           </a:p>
@@ -1741,7 +1741,7 @@
           <a:p>
             <a:fld id="{51D7A023-FFD0-4B7A-9EE2-802EE373A222}" type="datetimeFigureOut">
               <a:rPr lang="en-US" smtClean="0"/>
-              <a:t>7/27/2014</a:t>
+              <a:t>7/29/2014</a:t>
             </a:fld>
             <a:endParaRPr lang="en-US"/>
           </a:p>
@@ -1836,7 +1836,7 @@
           <a:p>
             <a:fld id="{51D7A023-FFD0-4B7A-9EE2-802EE373A222}" type="datetimeFigureOut">
               <a:rPr lang="en-US" smtClean="0"/>
-              <a:t>7/27/2014</a:t>
+              <a:t>7/29/2014</a:t>
             </a:fld>
             <a:endParaRPr lang="en-US"/>
           </a:p>
@@ -2113,7 +2113,7 @@
           <a:p>
             <a:fld id="{51D7A023-FFD0-4B7A-9EE2-802EE373A222}" type="datetimeFigureOut">
               <a:rPr lang="en-US" smtClean="0"/>
-              <a:t>7/27/2014</a:t>
+              <a:t>7/29/2014</a:t>
             </a:fld>
             <a:endParaRPr lang="en-US"/>
           </a:p>
@@ -2366,7 +2366,7 @@
           <a:p>
             <a:fld id="{51D7A023-FFD0-4B7A-9EE2-802EE373A222}" type="datetimeFigureOut">
               <a:rPr lang="en-US" smtClean="0"/>
-              <a:t>7/27/2014</a:t>
+              <a:t>7/29/2014</a:t>
             </a:fld>
             <a:endParaRPr lang="en-US"/>
           </a:p>
@@ -2579,7 +2579,7 @@
           <a:p>
             <a:fld id="{51D7A023-FFD0-4B7A-9EE2-802EE373A222}" type="datetimeFigureOut">
               <a:rPr lang="en-US" smtClean="0"/>
-              <a:t>7/27/2014</a:t>
+              <a:t>7/29/2014</a:t>
             </a:fld>
             <a:endParaRPr lang="en-US"/>
           </a:p>
@@ -3201,15 +3201,7 @@
             </a:pPr>
             <a:r>
               <a:rPr lang="en-US" dirty="0" smtClean="0"/>
-              <a:t>/* calling the </a:t>
-            </a:r>
-            <a:r>
-              <a:rPr lang="en-US" dirty="0" smtClean="0"/>
-              <a:t>function </a:t>
-            </a:r>
-            <a:r>
-              <a:rPr lang="en-US" dirty="0" smtClean="0"/>
-              <a:t>*/</a:t>
+              <a:t>/* calling the function */</a:t>
             </a:r>
           </a:p>
           <a:p>
@@ -4266,8 +4258,16 @@
               <a:t>        result &lt;- value * </a:t>
             </a:r>
             <a:r>
+              <a:rPr lang="en-US" dirty="0" smtClean="0"/>
+              <a:t>( </a:t>
+            </a:r>
+            <a:r>
               <a:rPr lang="en-US" dirty="0" err="1" smtClean="0"/>
               <a:t>pct</a:t>
+            </a:r>
+            <a:r>
+              <a:rPr lang="en-US" smtClean="0"/>
+              <a:t> / 100 )</a:t>
             </a:r>
             <a:endParaRPr lang="en-US" dirty="0"/>
           </a:p>
@@ -5117,7 +5117,7 @@
         <p:spPr/>
         <p:txBody>
           <a:bodyPr>
-            <a:normAutofit fontScale="92500" lnSpcReduction="20000"/>
+            <a:normAutofit fontScale="85000" lnSpcReduction="20000"/>
           </a:bodyPr>
           <a:lstStyle/>
           <a:p>
@@ -5149,29 +5149,11 @@
           <a:p>
             <a:r>
               <a:rPr lang="en-US" dirty="0" smtClean="0"/>
-              <a:t>Can </a:t>
-            </a:r>
-            <a:r>
-              <a:rPr lang="en-US" dirty="0"/>
-              <a:t>be </a:t>
-            </a:r>
-            <a:r>
-              <a:rPr lang="en-US" dirty="0" smtClean="0"/>
-              <a:t>combined </a:t>
-            </a:r>
-            <a:r>
-              <a:rPr lang="en-US" dirty="0"/>
-              <a:t>in new and interesting ways to solve larger </a:t>
-            </a:r>
-            <a:r>
-              <a:rPr lang="en-US" dirty="0" smtClean="0"/>
-              <a:t>problems</a:t>
-            </a:r>
-          </a:p>
-          <a:p>
-            <a:r>
-              <a:rPr lang="en-US" dirty="0" smtClean="0"/>
-              <a:t>Defines an interface that the component uses to interact with the outside world</a:t>
+              <a:t>Defines </a:t>
+            </a:r>
+            <a:r>
+              <a:rPr lang="en-US" dirty="0" smtClean="0"/>
+              <a:t>an interface that the component uses to interact with the outside world</a:t>
             </a:r>
           </a:p>
           <a:p>
@@ -5223,8 +5205,21 @@
             </a:r>
             <a:r>
               <a:rPr lang="en-US" dirty="0"/>
-              <a:t>be shared with colleagues and the rest of the community ( github! )</a:t>
-            </a:r>
+              <a:t>be shared with colleagues and the rest of the community ( github! </a:t>
+            </a:r>
+            <a:r>
+              <a:rPr lang="en-US" dirty="0" smtClean="0"/>
+              <a:t>)</a:t>
+            </a:r>
+          </a:p>
+          <a:p>
+            <a:r>
+              <a:rPr lang="en-US" dirty="0"/>
+              <a:t>Can be combined in new and interesting ways to solve larger problems</a:t>
+            </a:r>
+          </a:p>
+          <a:p>
+            <a:endParaRPr lang="en-US" dirty="0"/>
           </a:p>
           <a:p>
             <a:pPr marL="0" indent="0">
@@ -5516,11 +5511,7 @@
             </a:r>
             <a:r>
               <a:rPr lang="en-US" dirty="0" smtClean="0"/>
-              <a:t>( </a:t>
-            </a:r>
-            <a:r>
-              <a:rPr lang="en-US" dirty="0" smtClean="0"/>
-              <a:t>10, 110 )</a:t>
+              <a:t>( 10, 110 )</a:t>
             </a:r>
             <a:endParaRPr lang="en-US" dirty="0"/>
           </a:p>
@@ -5638,11 +5629,7 @@
             </a:r>
             <a:r>
               <a:rPr lang="en-US" dirty="0" smtClean="0"/>
-              <a:t>add error checking </a:t>
-            </a:r>
-            <a:r>
-              <a:rPr lang="en-US" dirty="0" smtClean="0"/>
-              <a:t>here</a:t>
+              <a:t>add error checking here</a:t>
             </a:r>
           </a:p>
           <a:p>

</xml_diff>